<commit_message>
Added some finishing touches to the powerpoint
</commit_message>
<xml_diff>
--- a/Knightshade_Presentation.pptx
+++ b/Knightshade_Presentation.pptx
@@ -170,7 +170,7 @@
           <a:noFill/>
           <a:extLst>
             <a:ext uri="{909E8E84-426E-40dd-AFC4-6F175D3DCCD1}">
-              <a14:hiddenFill xmlns="" xmlns:a14="http://schemas.microsoft.com/office/drawing/2010/main">
+              <a14:hiddenFill xmlns:a14="http://schemas.microsoft.com/office/drawing/2010/main" xmlns="">
                 <a:solidFill>
                   <a:srgbClr val="FFFFFF"/>
                 </a:solidFill>
@@ -230,7 +230,7 @@
             </a:ln>
             <a:extLst>
               <a:ext uri="{91240B29-F687-4f45-9708-019B960494DF}">
-                <a14:hiddenLine xmlns="" xmlns:a14="http://schemas.microsoft.com/office/drawing/2010/main" w="9525">
+                <a14:hiddenLine xmlns:a14="http://schemas.microsoft.com/office/drawing/2010/main" xmlns="" w="9525">
                   <a:solidFill>
                     <a:srgbClr val="000000"/>
                   </a:solidFill>
@@ -320,7 +320,7 @@
             </a:ln>
             <a:extLst>
               <a:ext uri="{91240B29-F687-4f45-9708-019B960494DF}">
-                <a14:hiddenLine xmlns="" xmlns:a14="http://schemas.microsoft.com/office/drawing/2010/main" w="9525">
+                <a14:hiddenLine xmlns:a14="http://schemas.microsoft.com/office/drawing/2010/main" xmlns="" w="9525">
                   <a:solidFill>
                     <a:srgbClr val="000000"/>
                   </a:solidFill>
@@ -410,7 +410,7 @@
             </a:ln>
             <a:extLst>
               <a:ext uri="{91240B29-F687-4f45-9708-019B960494DF}">
-                <a14:hiddenLine xmlns="" xmlns:a14="http://schemas.microsoft.com/office/drawing/2010/main" w="9525">
+                <a14:hiddenLine xmlns:a14="http://schemas.microsoft.com/office/drawing/2010/main" xmlns="" w="9525">
                   <a:solidFill>
                     <a:srgbClr val="000000"/>
                   </a:solidFill>
@@ -444,7 +444,7 @@
             </a:ln>
             <a:extLst>
               <a:ext uri="{91240B29-F687-4f45-9708-019B960494DF}">
-                <a14:hiddenLine xmlns="" xmlns:a14="http://schemas.microsoft.com/office/drawing/2010/main" w="9525">
+                <a14:hiddenLine xmlns:a14="http://schemas.microsoft.com/office/drawing/2010/main" xmlns="" w="9525">
                   <a:solidFill>
                     <a:srgbClr val="000000"/>
                   </a:solidFill>
@@ -534,7 +534,7 @@
             </a:ln>
             <a:extLst>
               <a:ext uri="{91240B29-F687-4f45-9708-019B960494DF}">
-                <a14:hiddenLine xmlns="" xmlns:a14="http://schemas.microsoft.com/office/drawing/2010/main" w="9525">
+                <a14:hiddenLine xmlns:a14="http://schemas.microsoft.com/office/drawing/2010/main" xmlns="" w="9525">
                   <a:solidFill>
                     <a:srgbClr val="000000"/>
                   </a:solidFill>
@@ -596,7 +596,7 @@
             </a:ln>
             <a:extLst>
               <a:ext uri="{91240B29-F687-4f45-9708-019B960494DF}">
-                <a14:hiddenLine xmlns="" xmlns:a14="http://schemas.microsoft.com/office/drawing/2010/main" w="9525">
+                <a14:hiddenLine xmlns:a14="http://schemas.microsoft.com/office/drawing/2010/main" xmlns="" w="9525">
                   <a:solidFill>
                     <a:srgbClr val="000000"/>
                   </a:solidFill>
@@ -658,7 +658,7 @@
             </a:ln>
             <a:extLst>
               <a:ext uri="{91240B29-F687-4f45-9708-019B960494DF}">
-                <a14:hiddenLine xmlns="" xmlns:a14="http://schemas.microsoft.com/office/drawing/2010/main" w="9525">
+                <a14:hiddenLine xmlns:a14="http://schemas.microsoft.com/office/drawing/2010/main" xmlns="" w="9525">
                   <a:solidFill>
                     <a:srgbClr val="000000"/>
                   </a:solidFill>
@@ -748,7 +748,7 @@
             </a:ln>
             <a:extLst>
               <a:ext uri="{91240B29-F687-4f45-9708-019B960494DF}">
-                <a14:hiddenLine xmlns="" xmlns:a14="http://schemas.microsoft.com/office/drawing/2010/main" w="9525">
+                <a14:hiddenLine xmlns:a14="http://schemas.microsoft.com/office/drawing/2010/main" xmlns="" w="9525">
                   <a:solidFill>
                     <a:srgbClr val="000000"/>
                   </a:solidFill>
@@ -810,7 +810,7 @@
             </a:ln>
             <a:extLst>
               <a:ext uri="{91240B29-F687-4f45-9708-019B960494DF}">
-                <a14:hiddenLine xmlns="" xmlns:a14="http://schemas.microsoft.com/office/drawing/2010/main" w="9525">
+                <a14:hiddenLine xmlns:a14="http://schemas.microsoft.com/office/drawing/2010/main" xmlns="" w="9525">
                   <a:solidFill>
                     <a:srgbClr val="000000"/>
                   </a:solidFill>
@@ -872,7 +872,7 @@
             </a:ln>
             <a:extLst>
               <a:ext uri="{91240B29-F687-4f45-9708-019B960494DF}">
-                <a14:hiddenLine xmlns="" xmlns:a14="http://schemas.microsoft.com/office/drawing/2010/main" w="9525">
+                <a14:hiddenLine xmlns:a14="http://schemas.microsoft.com/office/drawing/2010/main" xmlns="" w="9525">
                   <a:solidFill>
                     <a:srgbClr val="000000"/>
                   </a:solidFill>
@@ -962,7 +962,7 @@
             </a:ln>
             <a:extLst>
               <a:ext uri="{91240B29-F687-4f45-9708-019B960494DF}">
-                <a14:hiddenLine xmlns="" xmlns:a14="http://schemas.microsoft.com/office/drawing/2010/main" w="9525">
+                <a14:hiddenLine xmlns:a14="http://schemas.microsoft.com/office/drawing/2010/main" xmlns="" w="9525">
                   <a:solidFill>
                     <a:srgbClr val="000000"/>
                   </a:solidFill>
@@ -1052,7 +1052,7 @@
             </a:ln>
             <a:extLst>
               <a:ext uri="{91240B29-F687-4f45-9708-019B960494DF}">
-                <a14:hiddenLine xmlns="" xmlns:a14="http://schemas.microsoft.com/office/drawing/2010/main" w="9525">
+                <a14:hiddenLine xmlns:a14="http://schemas.microsoft.com/office/drawing/2010/main" xmlns="" w="9525">
                   <a:solidFill>
                     <a:srgbClr val="000000"/>
                   </a:solidFill>
@@ -1114,7 +1114,7 @@
             </a:ln>
             <a:extLst>
               <a:ext uri="{91240B29-F687-4f45-9708-019B960494DF}">
-                <a14:hiddenLine xmlns="" xmlns:a14="http://schemas.microsoft.com/office/drawing/2010/main" w="9525">
+                <a14:hiddenLine xmlns:a14="http://schemas.microsoft.com/office/drawing/2010/main" xmlns="" w="9525">
                   <a:solidFill>
                     <a:srgbClr val="000000"/>
                   </a:solidFill>
@@ -1224,7 +1224,7 @@
             </a:ln>
             <a:extLst>
               <a:ext uri="{91240B29-F687-4f45-9708-019B960494DF}">
-                <a14:hiddenLine xmlns="" xmlns:a14="http://schemas.microsoft.com/office/drawing/2010/main" w="9525">
+                <a14:hiddenLine xmlns:a14="http://schemas.microsoft.com/office/drawing/2010/main" xmlns="" w="9525">
                   <a:solidFill>
                     <a:srgbClr val="000000"/>
                   </a:solidFill>
@@ -1286,7 +1286,7 @@
             </a:ln>
             <a:extLst>
               <a:ext uri="{91240B29-F687-4f45-9708-019B960494DF}">
-                <a14:hiddenLine xmlns="" xmlns:a14="http://schemas.microsoft.com/office/drawing/2010/main" w="9525">
+                <a14:hiddenLine xmlns:a14="http://schemas.microsoft.com/office/drawing/2010/main" xmlns="" w="9525">
                   <a:solidFill>
                     <a:srgbClr val="000000"/>
                   </a:solidFill>
@@ -1376,7 +1376,7 @@
             </a:ln>
             <a:extLst>
               <a:ext uri="{91240B29-F687-4f45-9708-019B960494DF}">
-                <a14:hiddenLine xmlns="" xmlns:a14="http://schemas.microsoft.com/office/drawing/2010/main" w="9525">
+                <a14:hiddenLine xmlns:a14="http://schemas.microsoft.com/office/drawing/2010/main" xmlns="" w="9525">
                   <a:solidFill>
                     <a:srgbClr val="000000"/>
                   </a:solidFill>
@@ -1466,7 +1466,7 @@
             </a:ln>
             <a:extLst>
               <a:ext uri="{91240B29-F687-4f45-9708-019B960494DF}">
-                <a14:hiddenLine xmlns="" xmlns:a14="http://schemas.microsoft.com/office/drawing/2010/main" w="9525">
+                <a14:hiddenLine xmlns:a14="http://schemas.microsoft.com/office/drawing/2010/main" xmlns="" w="9525">
                   <a:solidFill>
                     <a:srgbClr val="000000"/>
                   </a:solidFill>
@@ -1528,7 +1528,7 @@
             </a:ln>
             <a:extLst>
               <a:ext uri="{91240B29-F687-4f45-9708-019B960494DF}">
-                <a14:hiddenLine xmlns="" xmlns:a14="http://schemas.microsoft.com/office/drawing/2010/main" w="9525">
+                <a14:hiddenLine xmlns:a14="http://schemas.microsoft.com/office/drawing/2010/main" xmlns="" w="9525">
                   <a:solidFill>
                     <a:srgbClr val="000000"/>
                   </a:solidFill>
@@ -1618,7 +1618,7 @@
             </a:ln>
             <a:extLst>
               <a:ext uri="{91240B29-F687-4f45-9708-019B960494DF}">
-                <a14:hiddenLine xmlns="" xmlns:a14="http://schemas.microsoft.com/office/drawing/2010/main" w="9525">
+                <a14:hiddenLine xmlns:a14="http://schemas.microsoft.com/office/drawing/2010/main" xmlns="" w="9525">
                   <a:solidFill>
                     <a:srgbClr val="000000"/>
                   </a:solidFill>
@@ -1708,7 +1708,7 @@
             </a:ln>
             <a:extLst>
               <a:ext uri="{91240B29-F687-4f45-9708-019B960494DF}">
-                <a14:hiddenLine xmlns="" xmlns:a14="http://schemas.microsoft.com/office/drawing/2010/main" w="9525">
+                <a14:hiddenLine xmlns:a14="http://schemas.microsoft.com/office/drawing/2010/main" xmlns="" w="9525">
                   <a:solidFill>
                     <a:srgbClr val="000000"/>
                   </a:solidFill>
@@ -1764,7 +1764,7 @@
             </a:ln>
             <a:extLst>
               <a:ext uri="{91240B29-F687-4f45-9708-019B960494DF}">
-                <a14:hiddenLine xmlns="" xmlns:a14="http://schemas.microsoft.com/office/drawing/2010/main" w="9525">
+                <a14:hiddenLine xmlns:a14="http://schemas.microsoft.com/office/drawing/2010/main" xmlns="" w="9525">
                   <a:solidFill>
                     <a:srgbClr val="000000"/>
                   </a:solidFill>
@@ -1854,7 +1854,7 @@
             </a:ln>
             <a:extLst>
               <a:ext uri="{91240B29-F687-4f45-9708-019B960494DF}">
-                <a14:hiddenLine xmlns="" xmlns:a14="http://schemas.microsoft.com/office/drawing/2010/main" w="9525">
+                <a14:hiddenLine xmlns:a14="http://schemas.microsoft.com/office/drawing/2010/main" xmlns="" w="9525">
                   <a:solidFill>
                     <a:srgbClr val="000000"/>
                   </a:solidFill>
@@ -1910,7 +1910,7 @@
             </a:ln>
             <a:extLst>
               <a:ext uri="{91240B29-F687-4f45-9708-019B960494DF}">
-                <a14:hiddenLine xmlns="" xmlns:a14="http://schemas.microsoft.com/office/drawing/2010/main" w="9525">
+                <a14:hiddenLine xmlns:a14="http://schemas.microsoft.com/office/drawing/2010/main" xmlns="" w="9525">
                   <a:solidFill>
                     <a:srgbClr val="000000"/>
                   </a:solidFill>
@@ -2000,7 +2000,7 @@
             </a:ln>
             <a:extLst>
               <a:ext uri="{91240B29-F687-4f45-9708-019B960494DF}">
-                <a14:hiddenLine xmlns="" xmlns:a14="http://schemas.microsoft.com/office/drawing/2010/main" w="9525">
+                <a14:hiddenLine xmlns:a14="http://schemas.microsoft.com/office/drawing/2010/main" xmlns="" w="9525">
                   <a:solidFill>
                     <a:srgbClr val="000000"/>
                   </a:solidFill>
@@ -2068,7 +2068,7 @@
             </a:ln>
             <a:extLst>
               <a:ext uri="{91240B29-F687-4f45-9708-019B960494DF}">
-                <a14:hiddenLine xmlns="" xmlns:a14="http://schemas.microsoft.com/office/drawing/2010/main" w="9525">
+                <a14:hiddenLine xmlns:a14="http://schemas.microsoft.com/office/drawing/2010/main" xmlns="" w="9525">
                   <a:solidFill>
                     <a:srgbClr val="000000"/>
                   </a:solidFill>
@@ -2158,7 +2158,7 @@
             </a:ln>
             <a:extLst>
               <a:ext uri="{91240B29-F687-4f45-9708-019B960494DF}">
-                <a14:hiddenLine xmlns="" xmlns:a14="http://schemas.microsoft.com/office/drawing/2010/main" w="9525">
+                <a14:hiddenLine xmlns:a14="http://schemas.microsoft.com/office/drawing/2010/main" xmlns="" w="9525">
                   <a:solidFill>
                     <a:srgbClr val="000000"/>
                   </a:solidFill>
@@ -2226,7 +2226,7 @@
             </a:ln>
             <a:extLst>
               <a:ext uri="{91240B29-F687-4f45-9708-019B960494DF}">
-                <a14:hiddenLine xmlns="" xmlns:a14="http://schemas.microsoft.com/office/drawing/2010/main" w="9525">
+                <a14:hiddenLine xmlns:a14="http://schemas.microsoft.com/office/drawing/2010/main" xmlns="" w="9525">
                   <a:solidFill>
                     <a:srgbClr val="000000"/>
                   </a:solidFill>
@@ -2316,7 +2316,7 @@
             </a:ln>
             <a:extLst>
               <a:ext uri="{91240B29-F687-4f45-9708-019B960494DF}">
-                <a14:hiddenLine xmlns="" xmlns:a14="http://schemas.microsoft.com/office/drawing/2010/main" w="9525">
+                <a14:hiddenLine xmlns:a14="http://schemas.microsoft.com/office/drawing/2010/main" xmlns="" w="9525">
                   <a:solidFill>
                     <a:srgbClr val="000000"/>
                   </a:solidFill>
@@ -2350,7 +2350,7 @@
             </a:ln>
             <a:extLst>
               <a:ext uri="{91240B29-F687-4f45-9708-019B960494DF}">
-                <a14:hiddenLine xmlns="" xmlns:a14="http://schemas.microsoft.com/office/drawing/2010/main" w="9525">
+                <a14:hiddenLine xmlns:a14="http://schemas.microsoft.com/office/drawing/2010/main" xmlns="" w="9525">
                   <a:solidFill>
                     <a:srgbClr val="000000"/>
                   </a:solidFill>
@@ -2440,7 +2440,7 @@
             </a:ln>
             <a:extLst>
               <a:ext uri="{91240B29-F687-4f45-9708-019B960494DF}">
-                <a14:hiddenLine xmlns="" xmlns:a14="http://schemas.microsoft.com/office/drawing/2010/main" w="9525">
+                <a14:hiddenLine xmlns:a14="http://schemas.microsoft.com/office/drawing/2010/main" xmlns="" w="9525">
                   <a:solidFill>
                     <a:srgbClr val="000000"/>
                   </a:solidFill>
@@ -2502,7 +2502,7 @@
             </a:ln>
             <a:extLst>
               <a:ext uri="{91240B29-F687-4f45-9708-019B960494DF}">
-                <a14:hiddenLine xmlns="" xmlns:a14="http://schemas.microsoft.com/office/drawing/2010/main" w="9525">
+                <a14:hiddenLine xmlns:a14="http://schemas.microsoft.com/office/drawing/2010/main" xmlns="" w="9525">
                   <a:solidFill>
                     <a:srgbClr val="000000"/>
                   </a:solidFill>
@@ -2564,7 +2564,7 @@
             </a:ln>
             <a:extLst>
               <a:ext uri="{91240B29-F687-4f45-9708-019B960494DF}">
-                <a14:hiddenLine xmlns="" xmlns:a14="http://schemas.microsoft.com/office/drawing/2010/main" w="9525">
+                <a14:hiddenLine xmlns:a14="http://schemas.microsoft.com/office/drawing/2010/main" xmlns="" w="9525">
                   <a:solidFill>
                     <a:srgbClr val="000000"/>
                   </a:solidFill>
@@ -2654,7 +2654,7 @@
             </a:ln>
             <a:extLst>
               <a:ext uri="{91240B29-F687-4f45-9708-019B960494DF}">
-                <a14:hiddenLine xmlns="" xmlns:a14="http://schemas.microsoft.com/office/drawing/2010/main" w="9525">
+                <a14:hiddenLine xmlns:a14="http://schemas.microsoft.com/office/drawing/2010/main" xmlns="" w="9525">
                   <a:solidFill>
                     <a:srgbClr val="000000"/>
                   </a:solidFill>
@@ -2722,7 +2722,7 @@
             </a:ln>
             <a:extLst>
               <a:ext uri="{91240B29-F687-4f45-9708-019B960494DF}">
-                <a14:hiddenLine xmlns="" xmlns:a14="http://schemas.microsoft.com/office/drawing/2010/main" w="9525">
+                <a14:hiddenLine xmlns:a14="http://schemas.microsoft.com/office/drawing/2010/main" xmlns="" w="9525">
                   <a:solidFill>
                     <a:srgbClr val="000000"/>
                   </a:solidFill>
@@ -2784,7 +2784,7 @@
             </a:ln>
             <a:extLst>
               <a:ext uri="{91240B29-F687-4f45-9708-019B960494DF}">
-                <a14:hiddenLine xmlns="" xmlns:a14="http://schemas.microsoft.com/office/drawing/2010/main" w="9525">
+                <a14:hiddenLine xmlns:a14="http://schemas.microsoft.com/office/drawing/2010/main" xmlns="" w="9525">
                   <a:solidFill>
                     <a:srgbClr val="000000"/>
                   </a:solidFill>
@@ -2874,7 +2874,7 @@
             </a:ln>
             <a:extLst>
               <a:ext uri="{91240B29-F687-4f45-9708-019B960494DF}">
-                <a14:hiddenLine xmlns="" xmlns:a14="http://schemas.microsoft.com/office/drawing/2010/main" w="9525">
+                <a14:hiddenLine xmlns:a14="http://schemas.microsoft.com/office/drawing/2010/main" xmlns="" w="9525">
                   <a:solidFill>
                     <a:srgbClr val="000000"/>
                   </a:solidFill>
@@ -2936,7 +2936,7 @@
             </a:ln>
             <a:extLst>
               <a:ext uri="{91240B29-F687-4f45-9708-019B960494DF}">
-                <a14:hiddenLine xmlns="" xmlns:a14="http://schemas.microsoft.com/office/drawing/2010/main" w="9525">
+                <a14:hiddenLine xmlns:a14="http://schemas.microsoft.com/office/drawing/2010/main" xmlns="" w="9525">
                   <a:solidFill>
                     <a:srgbClr val="000000"/>
                   </a:solidFill>
@@ -3026,7 +3026,7 @@
             </a:ln>
             <a:extLst>
               <a:ext uri="{91240B29-F687-4f45-9708-019B960494DF}">
-                <a14:hiddenLine xmlns="" xmlns:a14="http://schemas.microsoft.com/office/drawing/2010/main" w="9525">
+                <a14:hiddenLine xmlns:a14="http://schemas.microsoft.com/office/drawing/2010/main" xmlns="" w="9525">
                   <a:solidFill>
                     <a:srgbClr val="000000"/>
                   </a:solidFill>
@@ -3088,7 +3088,7 @@
             </a:ln>
             <a:extLst>
               <a:ext uri="{91240B29-F687-4f45-9708-019B960494DF}">
-                <a14:hiddenLine xmlns="" xmlns:a14="http://schemas.microsoft.com/office/drawing/2010/main" w="9525">
+                <a14:hiddenLine xmlns:a14="http://schemas.microsoft.com/office/drawing/2010/main" xmlns="" w="9525">
                   <a:solidFill>
                     <a:srgbClr val="000000"/>
                   </a:solidFill>
@@ -3178,7 +3178,7 @@
             </a:ln>
             <a:extLst>
               <a:ext uri="{91240B29-F687-4f45-9708-019B960494DF}">
-                <a14:hiddenLine xmlns="" xmlns:a14="http://schemas.microsoft.com/office/drawing/2010/main" w="9525">
+                <a14:hiddenLine xmlns:a14="http://schemas.microsoft.com/office/drawing/2010/main" xmlns="" w="9525">
                   <a:solidFill>
                     <a:srgbClr val="000000"/>
                   </a:solidFill>
@@ -3212,7 +3212,7 @@
             </a:ln>
             <a:extLst>
               <a:ext uri="{91240B29-F687-4f45-9708-019B960494DF}">
-                <a14:hiddenLine xmlns="" xmlns:a14="http://schemas.microsoft.com/office/drawing/2010/main" w="9525">
+                <a14:hiddenLine xmlns:a14="http://schemas.microsoft.com/office/drawing/2010/main" xmlns="" w="9525">
                   <a:solidFill>
                     <a:srgbClr val="000000"/>
                   </a:solidFill>
@@ -3277,7 +3277,7 @@
             </a:ln>
             <a:extLst>
               <a:ext uri="{91240B29-F687-4f45-9708-019B960494DF}">
-                <a14:hiddenLine xmlns="" xmlns:a14="http://schemas.microsoft.com/office/drawing/2010/main" w="9525">
+                <a14:hiddenLine xmlns:a14="http://schemas.microsoft.com/office/drawing/2010/main" xmlns="" w="9525">
                   <a:solidFill>
                     <a:srgbClr val="000000"/>
                   </a:solidFill>
@@ -3367,7 +3367,7 @@
             </a:ln>
             <a:extLst>
               <a:ext uri="{91240B29-F687-4f45-9708-019B960494DF}">
-                <a14:hiddenLine xmlns="" xmlns:a14="http://schemas.microsoft.com/office/drawing/2010/main" w="9525">
+                <a14:hiddenLine xmlns:a14="http://schemas.microsoft.com/office/drawing/2010/main" xmlns="" w="9525">
                   <a:solidFill>
                     <a:srgbClr val="000000"/>
                   </a:solidFill>
@@ -3429,7 +3429,7 @@
             </a:ln>
             <a:extLst>
               <a:ext uri="{91240B29-F687-4f45-9708-019B960494DF}">
-                <a14:hiddenLine xmlns="" xmlns:a14="http://schemas.microsoft.com/office/drawing/2010/main" w="9525">
+                <a14:hiddenLine xmlns:a14="http://schemas.microsoft.com/office/drawing/2010/main" xmlns="" w="9525">
                   <a:solidFill>
                     <a:srgbClr val="000000"/>
                   </a:solidFill>
@@ -3519,7 +3519,7 @@
             </a:ln>
             <a:extLst>
               <a:ext uri="{91240B29-F687-4f45-9708-019B960494DF}">
-                <a14:hiddenLine xmlns="" xmlns:a14="http://schemas.microsoft.com/office/drawing/2010/main" w="9525">
+                <a14:hiddenLine xmlns:a14="http://schemas.microsoft.com/office/drawing/2010/main" xmlns="" w="9525">
                   <a:solidFill>
                     <a:srgbClr val="000000"/>
                   </a:solidFill>
@@ -3609,7 +3609,7 @@
             </a:ln>
             <a:extLst>
               <a:ext uri="{91240B29-F687-4f45-9708-019B960494DF}">
-                <a14:hiddenLine xmlns="" xmlns:a14="http://schemas.microsoft.com/office/drawing/2010/main" w="9525">
+                <a14:hiddenLine xmlns:a14="http://schemas.microsoft.com/office/drawing/2010/main" xmlns="" w="9525">
                   <a:solidFill>
                     <a:srgbClr val="000000"/>
                   </a:solidFill>
@@ -3674,7 +3674,7 @@
             </a:ln>
             <a:extLst>
               <a:ext uri="{91240B29-F687-4f45-9708-019B960494DF}">
-                <a14:hiddenLine xmlns="" xmlns:a14="http://schemas.microsoft.com/office/drawing/2010/main" w="9525">
+                <a14:hiddenLine xmlns:a14="http://schemas.microsoft.com/office/drawing/2010/main" xmlns="" w="9525">
                   <a:solidFill>
                     <a:srgbClr val="000000"/>
                   </a:solidFill>
@@ -3736,7 +3736,7 @@
             </a:ln>
             <a:extLst>
               <a:ext uri="{91240B29-F687-4f45-9708-019B960494DF}">
-                <a14:hiddenLine xmlns="" xmlns:a14="http://schemas.microsoft.com/office/drawing/2010/main" w="9525">
+                <a14:hiddenLine xmlns:a14="http://schemas.microsoft.com/office/drawing/2010/main" xmlns="" w="9525">
                   <a:solidFill>
                     <a:srgbClr val="000000"/>
                   </a:solidFill>
@@ -3826,7 +3826,7 @@
             </a:ln>
             <a:extLst>
               <a:ext uri="{91240B29-F687-4f45-9708-019B960494DF}">
-                <a14:hiddenLine xmlns="" xmlns:a14="http://schemas.microsoft.com/office/drawing/2010/main" w="9525">
+                <a14:hiddenLine xmlns:a14="http://schemas.microsoft.com/office/drawing/2010/main" xmlns="" w="9525">
                   <a:solidFill>
                     <a:srgbClr val="000000"/>
                   </a:solidFill>
@@ -3916,7 +3916,7 @@
             </a:ln>
             <a:extLst>
               <a:ext uri="{91240B29-F687-4f45-9708-019B960494DF}">
-                <a14:hiddenLine xmlns="" xmlns:a14="http://schemas.microsoft.com/office/drawing/2010/main" w="9525">
+                <a14:hiddenLine xmlns:a14="http://schemas.microsoft.com/office/drawing/2010/main" xmlns="" w="9525">
                   <a:solidFill>
                     <a:srgbClr val="000000"/>
                   </a:solidFill>
@@ -3978,7 +3978,7 @@
             </a:ln>
             <a:extLst>
               <a:ext uri="{91240B29-F687-4f45-9708-019B960494DF}">
-                <a14:hiddenLine xmlns="" xmlns:a14="http://schemas.microsoft.com/office/drawing/2010/main" w="9525">
+                <a14:hiddenLine xmlns:a14="http://schemas.microsoft.com/office/drawing/2010/main" xmlns="" w="9525">
                   <a:solidFill>
                     <a:srgbClr val="000000"/>
                   </a:solidFill>
@@ -4098,7 +4098,7 @@
             </a:ln>
             <a:extLst>
               <a:ext uri="{91240B29-F687-4f45-9708-019B960494DF}">
-                <a14:hiddenLine xmlns="" xmlns:a14="http://schemas.microsoft.com/office/drawing/2010/main" w="9525">
+                <a14:hiddenLine xmlns:a14="http://schemas.microsoft.com/office/drawing/2010/main" xmlns="" w="9525">
                   <a:solidFill>
                     <a:srgbClr val="000000"/>
                   </a:solidFill>
@@ -4166,7 +4166,7 @@
             </a:ln>
             <a:extLst>
               <a:ext uri="{91240B29-F687-4f45-9708-019B960494DF}">
-                <a14:hiddenLine xmlns="" xmlns:a14="http://schemas.microsoft.com/office/drawing/2010/main" w="9525">
+                <a14:hiddenLine xmlns:a14="http://schemas.microsoft.com/office/drawing/2010/main" xmlns="" w="9525">
                   <a:solidFill>
                     <a:srgbClr val="000000"/>
                   </a:solidFill>
@@ -4256,7 +4256,7 @@
             </a:ln>
             <a:extLst>
               <a:ext uri="{91240B29-F687-4f45-9708-019B960494DF}">
-                <a14:hiddenLine xmlns="" xmlns:a14="http://schemas.microsoft.com/office/drawing/2010/main" w="9525">
+                <a14:hiddenLine xmlns:a14="http://schemas.microsoft.com/office/drawing/2010/main" xmlns="" w="9525">
                   <a:solidFill>
                     <a:srgbClr val="000000"/>
                   </a:solidFill>
@@ -4396,7 +4396,7 @@
           <a:p>
             <a:fld id="{48A87A34-81AB-432B-8DAE-1953F412C126}" type="datetimeFigureOut">
               <a:rPr lang="en-US" dirty="0"/>
-              <a:t>10/12/21</a:t>
+              <a:t>10/13/21</a:t>
             </a:fld>
             <a:endParaRPr lang="en-US" dirty="0"/>
           </a:p>
@@ -4658,7 +4658,7 @@
           <a:p>
             <a:fld id="{48A87A34-81AB-432B-8DAE-1953F412C126}" type="datetimeFigureOut">
               <a:rPr lang="en-US" dirty="0"/>
-              <a:t>10/12/21</a:t>
+              <a:t>10/13/21</a:t>
             </a:fld>
             <a:endParaRPr lang="en-US" dirty="0"/>
           </a:p>
@@ -4849,7 +4849,7 @@
           <a:p>
             <a:fld id="{48A87A34-81AB-432B-8DAE-1953F412C126}" type="datetimeFigureOut">
               <a:rPr lang="en-US" dirty="0"/>
-              <a:t>10/12/21</a:t>
+              <a:t>10/13/21</a:t>
             </a:fld>
             <a:endParaRPr lang="en-US" dirty="0"/>
           </a:p>
@@ -5107,7 +5107,7 @@
           <a:p>
             <a:fld id="{48A87A34-81AB-432B-8DAE-1953F412C126}" type="datetimeFigureOut">
               <a:rPr lang="en-US" dirty="0"/>
-              <a:t>10/12/21</a:t>
+              <a:t>10/13/21</a:t>
             </a:fld>
             <a:endParaRPr lang="en-US" dirty="0"/>
           </a:p>
@@ -5536,7 +5536,7 @@
           <a:p>
             <a:fld id="{48A87A34-81AB-432B-8DAE-1953F412C126}" type="datetimeFigureOut">
               <a:rPr lang="en-US" dirty="0"/>
-              <a:t>10/12/21</a:t>
+              <a:t>10/13/21</a:t>
             </a:fld>
             <a:endParaRPr lang="en-US" dirty="0"/>
           </a:p>
@@ -6077,7 +6077,7 @@
           <a:p>
             <a:fld id="{48A87A34-81AB-432B-8DAE-1953F412C126}" type="datetimeFigureOut">
               <a:rPr lang="en-US" dirty="0"/>
-              <a:t>10/12/21</a:t>
+              <a:t>10/13/21</a:t>
             </a:fld>
             <a:endParaRPr lang="en-US" dirty="0"/>
           </a:p>
@@ -6792,7 +6792,7 @@
           <a:p>
             <a:fld id="{48A87A34-81AB-432B-8DAE-1953F412C126}" type="datetimeFigureOut">
               <a:rPr lang="en-US" dirty="0"/>
-              <a:t>10/12/21</a:t>
+              <a:t>10/13/21</a:t>
             </a:fld>
             <a:endParaRPr lang="en-US" dirty="0"/>
           </a:p>
@@ -6957,7 +6957,7 @@
           <a:p>
             <a:fld id="{48A87A34-81AB-432B-8DAE-1953F412C126}" type="datetimeFigureOut">
               <a:rPr lang="en-US" dirty="0"/>
-              <a:t>10/12/21</a:t>
+              <a:t>10/13/21</a:t>
             </a:fld>
             <a:endParaRPr lang="en-US" dirty="0"/>
           </a:p>
@@ -7132,7 +7132,7 @@
           <a:p>
             <a:fld id="{48A87A34-81AB-432B-8DAE-1953F412C126}" type="datetimeFigureOut">
               <a:rPr lang="en-US" dirty="0"/>
-              <a:t>10/12/21</a:t>
+              <a:t>10/13/21</a:t>
             </a:fld>
             <a:endParaRPr lang="en-US" dirty="0"/>
           </a:p>
@@ -7297,7 +7297,7 @@
           <a:p>
             <a:fld id="{48A87A34-81AB-432B-8DAE-1953F412C126}" type="datetimeFigureOut">
               <a:rPr lang="en-US" dirty="0"/>
-              <a:t>10/12/21</a:t>
+              <a:t>10/13/21</a:t>
             </a:fld>
             <a:endParaRPr lang="en-US" dirty="0"/>
           </a:p>
@@ -7542,7 +7542,7 @@
           <a:p>
             <a:fld id="{48A87A34-81AB-432B-8DAE-1953F412C126}" type="datetimeFigureOut">
               <a:rPr lang="en-US" dirty="0"/>
-              <a:t>10/12/21</a:t>
+              <a:t>10/13/21</a:t>
             </a:fld>
             <a:endParaRPr lang="en-US" dirty="0"/>
           </a:p>
@@ -7769,7 +7769,7 @@
           <a:p>
             <a:fld id="{48A87A34-81AB-432B-8DAE-1953F412C126}" type="datetimeFigureOut">
               <a:rPr lang="en-US" dirty="0"/>
-              <a:t>10/12/21</a:t>
+              <a:t>10/13/21</a:t>
             </a:fld>
             <a:endParaRPr lang="en-US" dirty="0"/>
           </a:p>
@@ -8145,7 +8145,7 @@
           <a:p>
             <a:fld id="{48A87A34-81AB-432B-8DAE-1953F412C126}" type="datetimeFigureOut">
               <a:rPr lang="en-US" dirty="0"/>
-              <a:t>10/12/21</a:t>
+              <a:t>10/13/21</a:t>
             </a:fld>
             <a:endParaRPr lang="en-US" dirty="0"/>
           </a:p>
@@ -8258,7 +8258,7 @@
           <a:p>
             <a:fld id="{48A87A34-81AB-432B-8DAE-1953F412C126}" type="datetimeFigureOut">
               <a:rPr lang="en-US" dirty="0"/>
-              <a:t>10/12/21</a:t>
+              <a:t>10/13/21</a:t>
             </a:fld>
             <a:endParaRPr lang="en-US" dirty="0"/>
           </a:p>
@@ -8348,7 +8348,7 @@
           <a:p>
             <a:fld id="{48A87A34-81AB-432B-8DAE-1953F412C126}" type="datetimeFigureOut">
               <a:rPr lang="en-US" dirty="0"/>
-              <a:t>10/12/21</a:t>
+              <a:t>10/13/21</a:t>
             </a:fld>
             <a:endParaRPr lang="en-US" dirty="0"/>
           </a:p>
@@ -8592,7 +8592,7 @@
           <a:p>
             <a:fld id="{48A87A34-81AB-432B-8DAE-1953F412C126}" type="datetimeFigureOut">
               <a:rPr lang="en-US" dirty="0"/>
-              <a:t>10/12/21</a:t>
+              <a:t>10/13/21</a:t>
             </a:fld>
             <a:endParaRPr lang="en-US" dirty="0"/>
           </a:p>
@@ -8867,7 +8867,7 @@
           <a:p>
             <a:fld id="{48A87A34-81AB-432B-8DAE-1953F412C126}" type="datetimeFigureOut">
               <a:rPr lang="en-US" dirty="0"/>
-              <a:t>10/12/21</a:t>
+              <a:t>10/13/21</a:t>
             </a:fld>
             <a:endParaRPr lang="en-US" dirty="0"/>
           </a:p>
@@ -8978,7 +8978,7 @@
           <a:noFill/>
           <a:extLst>
             <a:ext uri="{909E8E84-426E-40dd-AFC4-6F175D3DCCD1}">
-              <a14:hiddenFill xmlns="" xmlns:a14="http://schemas.microsoft.com/office/drawing/2010/main">
+              <a14:hiddenFill xmlns:a14="http://schemas.microsoft.com/office/drawing/2010/main" xmlns="">
                 <a:solidFill>
                   <a:srgbClr val="FFFFFF"/>
                 </a:solidFill>
@@ -9052,7 +9052,7 @@
               </a:ln>
               <a:extLst>
                 <a:ext uri="{91240B29-F687-4f45-9708-019B960494DF}">
-                  <a14:hiddenLine xmlns="" xmlns:a14="http://schemas.microsoft.com/office/drawing/2010/main" w="9525">
+                  <a14:hiddenLine xmlns:a14="http://schemas.microsoft.com/office/drawing/2010/main" xmlns="" w="9525">
                     <a:solidFill>
                       <a:srgbClr val="000000"/>
                     </a:solidFill>
@@ -9142,7 +9142,7 @@
               </a:ln>
               <a:extLst>
                 <a:ext uri="{91240B29-F687-4f45-9708-019B960494DF}">
-                  <a14:hiddenLine xmlns="" xmlns:a14="http://schemas.microsoft.com/office/drawing/2010/main" w="9525">
+                  <a14:hiddenLine xmlns:a14="http://schemas.microsoft.com/office/drawing/2010/main" xmlns="" w="9525">
                     <a:solidFill>
                       <a:srgbClr val="000000"/>
                     </a:solidFill>
@@ -9232,7 +9232,7 @@
               </a:ln>
               <a:extLst>
                 <a:ext uri="{91240B29-F687-4f45-9708-019B960494DF}">
-                  <a14:hiddenLine xmlns="" xmlns:a14="http://schemas.microsoft.com/office/drawing/2010/main" w="9525">
+                  <a14:hiddenLine xmlns:a14="http://schemas.microsoft.com/office/drawing/2010/main" xmlns="" w="9525">
                     <a:solidFill>
                       <a:srgbClr val="000000"/>
                     </a:solidFill>
@@ -9294,7 +9294,7 @@
               </a:ln>
               <a:extLst>
                 <a:ext uri="{91240B29-F687-4f45-9708-019B960494DF}">
-                  <a14:hiddenLine xmlns="" xmlns:a14="http://schemas.microsoft.com/office/drawing/2010/main" w="9525">
+                  <a14:hiddenLine xmlns:a14="http://schemas.microsoft.com/office/drawing/2010/main" xmlns="" w="9525">
                     <a:solidFill>
                       <a:srgbClr val="000000"/>
                     </a:solidFill>
@@ -9384,7 +9384,7 @@
               </a:ln>
               <a:extLst>
                 <a:ext uri="{91240B29-F687-4f45-9708-019B960494DF}">
-                  <a14:hiddenLine xmlns="" xmlns:a14="http://schemas.microsoft.com/office/drawing/2010/main" w="9525">
+                  <a14:hiddenLine xmlns:a14="http://schemas.microsoft.com/office/drawing/2010/main" xmlns="" w="9525">
                     <a:solidFill>
                       <a:srgbClr val="000000"/>
                     </a:solidFill>
@@ -9446,7 +9446,7 @@
               </a:ln>
               <a:extLst>
                 <a:ext uri="{91240B29-F687-4f45-9708-019B960494DF}">
-                  <a14:hiddenLine xmlns="" xmlns:a14="http://schemas.microsoft.com/office/drawing/2010/main" w="9525">
+                  <a14:hiddenLine xmlns:a14="http://schemas.microsoft.com/office/drawing/2010/main" xmlns="" w="9525">
                     <a:solidFill>
                       <a:srgbClr val="000000"/>
                     </a:solidFill>
@@ -9508,7 +9508,7 @@
               </a:ln>
               <a:extLst>
                 <a:ext uri="{91240B29-F687-4f45-9708-019B960494DF}">
-                  <a14:hiddenLine xmlns="" xmlns:a14="http://schemas.microsoft.com/office/drawing/2010/main" w="9525">
+                  <a14:hiddenLine xmlns:a14="http://schemas.microsoft.com/office/drawing/2010/main" xmlns="" w="9525">
                     <a:solidFill>
                       <a:srgbClr val="000000"/>
                     </a:solidFill>
@@ -9598,7 +9598,7 @@
               </a:ln>
               <a:extLst>
                 <a:ext uri="{91240B29-F687-4f45-9708-019B960494DF}">
-                  <a14:hiddenLine xmlns="" xmlns:a14="http://schemas.microsoft.com/office/drawing/2010/main" w="9525">
+                  <a14:hiddenLine xmlns:a14="http://schemas.microsoft.com/office/drawing/2010/main" xmlns="" w="9525">
                     <a:solidFill>
                       <a:srgbClr val="000000"/>
                     </a:solidFill>
@@ -9688,7 +9688,7 @@
               </a:ln>
               <a:extLst>
                 <a:ext uri="{91240B29-F687-4f45-9708-019B960494DF}">
-                  <a14:hiddenLine xmlns="" xmlns:a14="http://schemas.microsoft.com/office/drawing/2010/main" w="9525">
+                  <a14:hiddenLine xmlns:a14="http://schemas.microsoft.com/office/drawing/2010/main" xmlns="" w="9525">
                     <a:solidFill>
                       <a:srgbClr val="000000"/>
                     </a:solidFill>
@@ -9750,7 +9750,7 @@
               </a:ln>
               <a:extLst>
                 <a:ext uri="{91240B29-F687-4f45-9708-019B960494DF}">
-                  <a14:hiddenLine xmlns="" xmlns:a14="http://schemas.microsoft.com/office/drawing/2010/main" w="9525">
+                  <a14:hiddenLine xmlns:a14="http://schemas.microsoft.com/office/drawing/2010/main" xmlns="" w="9525">
                     <a:solidFill>
                       <a:srgbClr val="000000"/>
                     </a:solidFill>
@@ -9860,7 +9860,7 @@
               </a:ln>
               <a:extLst>
                 <a:ext uri="{91240B29-F687-4f45-9708-019B960494DF}">
-                  <a14:hiddenLine xmlns="" xmlns:a14="http://schemas.microsoft.com/office/drawing/2010/main" w="9525">
+                  <a14:hiddenLine xmlns:a14="http://schemas.microsoft.com/office/drawing/2010/main" xmlns="" w="9525">
                     <a:solidFill>
                       <a:srgbClr val="000000"/>
                     </a:solidFill>
@@ -9944,7 +9944,7 @@
               </a:ln>
               <a:extLst>
                 <a:ext uri="{91240B29-F687-4f45-9708-019B960494DF}">
-                  <a14:hiddenLine xmlns="" xmlns:a14="http://schemas.microsoft.com/office/drawing/2010/main" w="9525">
+                  <a14:hiddenLine xmlns:a14="http://schemas.microsoft.com/office/drawing/2010/main" xmlns="" w="9525">
                     <a:solidFill>
                       <a:srgbClr val="000000"/>
                     </a:solidFill>
@@ -10006,7 +10006,7 @@
               </a:ln>
               <a:extLst>
                 <a:ext uri="{91240B29-F687-4f45-9708-019B960494DF}">
-                  <a14:hiddenLine xmlns="" xmlns:a14="http://schemas.microsoft.com/office/drawing/2010/main" w="9525">
+                  <a14:hiddenLine xmlns:a14="http://schemas.microsoft.com/office/drawing/2010/main" xmlns="" w="9525">
                     <a:solidFill>
                       <a:srgbClr val="000000"/>
                     </a:solidFill>
@@ -10068,7 +10068,7 @@
               </a:ln>
               <a:extLst>
                 <a:ext uri="{91240B29-F687-4f45-9708-019B960494DF}">
-                  <a14:hiddenLine xmlns="" xmlns:a14="http://schemas.microsoft.com/office/drawing/2010/main" w="9525">
+                  <a14:hiddenLine xmlns:a14="http://schemas.microsoft.com/office/drawing/2010/main" xmlns="" w="9525">
                     <a:solidFill>
                       <a:srgbClr val="000000"/>
                     </a:solidFill>
@@ -10158,7 +10158,7 @@
               </a:ln>
               <a:extLst>
                 <a:ext uri="{91240B29-F687-4f45-9708-019B960494DF}">
-                  <a14:hiddenLine xmlns="" xmlns:a14="http://schemas.microsoft.com/office/drawing/2010/main" w="9525">
+                  <a14:hiddenLine xmlns:a14="http://schemas.microsoft.com/office/drawing/2010/main" xmlns="" w="9525">
                     <a:solidFill>
                       <a:srgbClr val="000000"/>
                     </a:solidFill>
@@ -10192,7 +10192,7 @@
               </a:ln>
               <a:extLst>
                 <a:ext uri="{91240B29-F687-4f45-9708-019B960494DF}">
-                  <a14:hiddenLine xmlns="" xmlns:a14="http://schemas.microsoft.com/office/drawing/2010/main" w="9525">
+                  <a14:hiddenLine xmlns:a14="http://schemas.microsoft.com/office/drawing/2010/main" xmlns="" w="9525">
                     <a:solidFill>
                       <a:srgbClr val="000000"/>
                     </a:solidFill>
@@ -10257,7 +10257,7 @@
               </a:ln>
               <a:extLst>
                 <a:ext uri="{91240B29-F687-4f45-9708-019B960494DF}">
-                  <a14:hiddenLine xmlns="" xmlns:a14="http://schemas.microsoft.com/office/drawing/2010/main" w="9525">
+                  <a14:hiddenLine xmlns:a14="http://schemas.microsoft.com/office/drawing/2010/main" xmlns="" w="9525">
                     <a:solidFill>
                       <a:srgbClr val="000000"/>
                     </a:solidFill>
@@ -10347,7 +10347,7 @@
               </a:ln>
               <a:extLst>
                 <a:ext uri="{91240B29-F687-4f45-9708-019B960494DF}">
-                  <a14:hiddenLine xmlns="" xmlns:a14="http://schemas.microsoft.com/office/drawing/2010/main" w="9525">
+                  <a14:hiddenLine xmlns:a14="http://schemas.microsoft.com/office/drawing/2010/main" xmlns="" w="9525">
                     <a:solidFill>
                       <a:srgbClr val="000000"/>
                     </a:solidFill>
@@ -10409,7 +10409,7 @@
               </a:ln>
               <a:extLst>
                 <a:ext uri="{91240B29-F687-4f45-9708-019B960494DF}">
-                  <a14:hiddenLine xmlns="" xmlns:a14="http://schemas.microsoft.com/office/drawing/2010/main" w="9525">
+                  <a14:hiddenLine xmlns:a14="http://schemas.microsoft.com/office/drawing/2010/main" xmlns="" w="9525">
                     <a:solidFill>
                       <a:srgbClr val="000000"/>
                     </a:solidFill>
@@ -10499,7 +10499,7 @@
               </a:ln>
               <a:extLst>
                 <a:ext uri="{91240B29-F687-4f45-9708-019B960494DF}">
-                  <a14:hiddenLine xmlns="" xmlns:a14="http://schemas.microsoft.com/office/drawing/2010/main" w="9525">
+                  <a14:hiddenLine xmlns:a14="http://schemas.microsoft.com/office/drawing/2010/main" xmlns="" w="9525">
                     <a:solidFill>
                       <a:srgbClr val="000000"/>
                     </a:solidFill>
@@ -10564,7 +10564,7 @@
               </a:ln>
               <a:extLst>
                 <a:ext uri="{91240B29-F687-4f45-9708-019B960494DF}">
-                  <a14:hiddenLine xmlns="" xmlns:a14="http://schemas.microsoft.com/office/drawing/2010/main" w="9525">
+                  <a14:hiddenLine xmlns:a14="http://schemas.microsoft.com/office/drawing/2010/main" xmlns="" w="9525">
                     <a:solidFill>
                       <a:srgbClr val="000000"/>
                     </a:solidFill>
@@ -10626,7 +10626,7 @@
               </a:ln>
               <a:extLst>
                 <a:ext uri="{91240B29-F687-4f45-9708-019B960494DF}">
-                  <a14:hiddenLine xmlns="" xmlns:a14="http://schemas.microsoft.com/office/drawing/2010/main" w="9525">
+                  <a14:hiddenLine xmlns:a14="http://schemas.microsoft.com/office/drawing/2010/main" xmlns="" w="9525">
                     <a:solidFill>
                       <a:srgbClr val="000000"/>
                     </a:solidFill>
@@ -10716,7 +10716,7 @@
               </a:ln>
               <a:extLst>
                 <a:ext uri="{91240B29-F687-4f45-9708-019B960494DF}">
-                  <a14:hiddenLine xmlns="" xmlns:a14="http://schemas.microsoft.com/office/drawing/2010/main" w="9525">
+                  <a14:hiddenLine xmlns:a14="http://schemas.microsoft.com/office/drawing/2010/main" xmlns="" w="9525">
                     <a:solidFill>
                       <a:srgbClr val="000000"/>
                     </a:solidFill>
@@ -10806,7 +10806,7 @@
               </a:ln>
               <a:extLst>
                 <a:ext uri="{91240B29-F687-4f45-9708-019B960494DF}">
-                  <a14:hiddenLine xmlns="" xmlns:a14="http://schemas.microsoft.com/office/drawing/2010/main" w="9525">
+                  <a14:hiddenLine xmlns:a14="http://schemas.microsoft.com/office/drawing/2010/main" xmlns="" w="9525">
                     <a:solidFill>
                       <a:srgbClr val="000000"/>
                     </a:solidFill>
@@ -10871,7 +10871,7 @@
               </a:ln>
               <a:extLst>
                 <a:ext uri="{91240B29-F687-4f45-9708-019B960494DF}">
-                  <a14:hiddenLine xmlns="" xmlns:a14="http://schemas.microsoft.com/office/drawing/2010/main" w="9525">
+                  <a14:hiddenLine xmlns:a14="http://schemas.microsoft.com/office/drawing/2010/main" xmlns="" w="9525">
                     <a:solidFill>
                       <a:srgbClr val="000000"/>
                     </a:solidFill>
@@ -10991,7 +10991,7 @@
               </a:ln>
               <a:extLst>
                 <a:ext uri="{91240B29-F687-4f45-9708-019B960494DF}">
-                  <a14:hiddenLine xmlns="" xmlns:a14="http://schemas.microsoft.com/office/drawing/2010/main" w="9525">
+                  <a14:hiddenLine xmlns:a14="http://schemas.microsoft.com/office/drawing/2010/main" xmlns="" w="9525">
                     <a:solidFill>
                       <a:srgbClr val="000000"/>
                     </a:solidFill>
@@ -11089,7 +11089,7 @@
               </a:ln>
               <a:extLst>
                 <a:ext uri="{91240B29-F687-4f45-9708-019B960494DF}">
-                  <a14:hiddenLine xmlns="" xmlns:a14="http://schemas.microsoft.com/office/drawing/2010/main" w="9525">
+                  <a14:hiddenLine xmlns:a14="http://schemas.microsoft.com/office/drawing/2010/main" xmlns="" w="9525">
                     <a:solidFill>
                       <a:srgbClr val="000000"/>
                     </a:solidFill>
@@ -11204,7 +11204,7 @@
               </a:ln>
               <a:extLst>
                 <a:ext uri="{91240B29-F687-4f45-9708-019B960494DF}">
-                  <a14:hiddenLine xmlns="" xmlns:a14="http://schemas.microsoft.com/office/drawing/2010/main" w="9525">
+                  <a14:hiddenLine xmlns:a14="http://schemas.microsoft.com/office/drawing/2010/main" xmlns="" w="9525">
                     <a:solidFill>
                       <a:srgbClr val="000000"/>
                     </a:solidFill>
@@ -11294,7 +11294,7 @@
               </a:ln>
               <a:extLst>
                 <a:ext uri="{91240B29-F687-4f45-9708-019B960494DF}">
-                  <a14:hiddenLine xmlns="" xmlns:a14="http://schemas.microsoft.com/office/drawing/2010/main" w="9525">
+                  <a14:hiddenLine xmlns:a14="http://schemas.microsoft.com/office/drawing/2010/main" xmlns="" w="9525">
                     <a:solidFill>
                       <a:srgbClr val="000000"/>
                     </a:solidFill>
@@ -11359,7 +11359,7 @@
               </a:ln>
               <a:extLst>
                 <a:ext uri="{91240B29-F687-4f45-9708-019B960494DF}">
-                  <a14:hiddenLine xmlns="" xmlns:a14="http://schemas.microsoft.com/office/drawing/2010/main" w="9525">
+                  <a14:hiddenLine xmlns:a14="http://schemas.microsoft.com/office/drawing/2010/main" xmlns="" w="9525">
                     <a:solidFill>
                       <a:srgbClr val="000000"/>
                     </a:solidFill>
@@ -11449,7 +11449,7 @@
               </a:ln>
               <a:extLst>
                 <a:ext uri="{91240B29-F687-4f45-9708-019B960494DF}">
-                  <a14:hiddenLine xmlns="" xmlns:a14="http://schemas.microsoft.com/office/drawing/2010/main" w="9525">
+                  <a14:hiddenLine xmlns:a14="http://schemas.microsoft.com/office/drawing/2010/main" xmlns="" w="9525">
                     <a:solidFill>
                       <a:srgbClr val="000000"/>
                     </a:solidFill>
@@ -11517,7 +11517,7 @@
               </a:ln>
               <a:extLst>
                 <a:ext uri="{91240B29-F687-4f45-9708-019B960494DF}">
-                  <a14:hiddenLine xmlns="" xmlns:a14="http://schemas.microsoft.com/office/drawing/2010/main" w="9525">
+                  <a14:hiddenLine xmlns:a14="http://schemas.microsoft.com/office/drawing/2010/main" xmlns="" w="9525">
                     <a:solidFill>
                       <a:srgbClr val="000000"/>
                     </a:solidFill>
@@ -11607,7 +11607,7 @@
               </a:ln>
               <a:extLst>
                 <a:ext uri="{91240B29-F687-4f45-9708-019B960494DF}">
-                  <a14:hiddenLine xmlns="" xmlns:a14="http://schemas.microsoft.com/office/drawing/2010/main" w="9525">
+                  <a14:hiddenLine xmlns:a14="http://schemas.microsoft.com/office/drawing/2010/main" xmlns="" w="9525">
                     <a:solidFill>
                       <a:srgbClr val="000000"/>
                     </a:solidFill>
@@ -11675,7 +11675,7 @@
               </a:ln>
               <a:extLst>
                 <a:ext uri="{91240B29-F687-4f45-9708-019B960494DF}">
-                  <a14:hiddenLine xmlns="" xmlns:a14="http://schemas.microsoft.com/office/drawing/2010/main" w="9525">
+                  <a14:hiddenLine xmlns:a14="http://schemas.microsoft.com/office/drawing/2010/main" xmlns="" w="9525">
                     <a:solidFill>
                       <a:srgbClr val="000000"/>
                     </a:solidFill>
@@ -11765,7 +11765,7 @@
               </a:ln>
               <a:extLst>
                 <a:ext uri="{91240B29-F687-4f45-9708-019B960494DF}">
-                  <a14:hiddenLine xmlns="" xmlns:a14="http://schemas.microsoft.com/office/drawing/2010/main" w="9525">
+                  <a14:hiddenLine xmlns:a14="http://schemas.microsoft.com/office/drawing/2010/main" xmlns="" w="9525">
                     <a:solidFill>
                       <a:srgbClr val="000000"/>
                     </a:solidFill>
@@ -11799,7 +11799,7 @@
               </a:ln>
               <a:extLst>
                 <a:ext uri="{91240B29-F687-4f45-9708-019B960494DF}">
-                  <a14:hiddenLine xmlns="" xmlns:a14="http://schemas.microsoft.com/office/drawing/2010/main" w="9525">
+                  <a14:hiddenLine xmlns:a14="http://schemas.microsoft.com/office/drawing/2010/main" xmlns="" w="9525">
                     <a:solidFill>
                       <a:srgbClr val="000000"/>
                     </a:solidFill>
@@ -11940,7 +11940,7 @@
             <a:fld id="{48A87A34-81AB-432B-8DAE-1953F412C126}" type="datetimeFigureOut">
               <a:rPr lang="en-US" dirty="0"/>
               <a:pPr/>
-              <a:t>10/12/21</a:t>
+              <a:t>10/13/21</a:t>
             </a:fld>
             <a:endParaRPr lang="en-US" dirty="0"/>
           </a:p>
@@ -12448,13 +12448,13 @@
   <p:clrMapOvr>
     <a:masterClrMapping/>
   </p:clrMapOvr>
-  <mc:AlternateContent xmlns:mc="http://schemas.openxmlformats.org/markup-compatibility/2006">
-    <mc:Choice xmlns:p15="http://schemas.microsoft.com/office/powerpoint/2012/main" Requires="p15">
+  <mc:AlternateContent xmlns:mc="http://schemas.openxmlformats.org/markup-compatibility/2006" xmlns:p15="http://schemas.microsoft.com/office/powerpoint/2012/main">
+    <mc:Choice Requires="p15">
       <p:transition xmlns:p14="http://schemas.microsoft.com/office/powerpoint/2010/main" spd="slow" p14:dur="6000">
         <p15:prstTrans prst="curtains"/>
       </p:transition>
     </mc:Choice>
-    <mc:Fallback>
+    <mc:Fallback xmlns="">
       <p:transition spd="slow">
         <p:fade/>
       </p:transition>
@@ -12558,13 +12558,13 @@
   <p:clrMapOvr>
     <a:masterClrMapping/>
   </p:clrMapOvr>
-  <mc:AlternateContent xmlns:mc="http://schemas.openxmlformats.org/markup-compatibility/2006">
-    <mc:Choice xmlns:p14="http://schemas.microsoft.com/office/powerpoint/2010/main" Requires="p14">
+  <mc:AlternateContent xmlns:mc="http://schemas.openxmlformats.org/markup-compatibility/2006" xmlns:p14="http://schemas.microsoft.com/office/powerpoint/2010/main">
+    <mc:Choice Requires="p14">
       <p:transition spd="slow" p14:dur="1400">
         <p14:doors dir="vert"/>
       </p:transition>
     </mc:Choice>
-    <mc:Fallback>
+    <mc:Fallback xmlns="">
       <p:transition spd="slow">
         <p:fade/>
       </p:transition>
@@ -12643,7 +12643,7 @@
           <a:p>
             <a:r>
               <a:rPr lang="en-US" dirty="0"/>
-              <a:t>Bitcoin and data collection:</a:t>
+              <a:t>Bitcoin data collection:</a:t>
             </a:r>
           </a:p>
           <a:p>
@@ -12753,13 +12753,13 @@
   <p:clrMapOvr>
     <a:masterClrMapping/>
   </p:clrMapOvr>
-  <mc:AlternateContent xmlns:mc="http://schemas.openxmlformats.org/markup-compatibility/2006">
-    <mc:Choice xmlns:p14="http://schemas.microsoft.com/office/powerpoint/2010/main" Requires="p14">
+  <mc:AlternateContent xmlns:mc="http://schemas.openxmlformats.org/markup-compatibility/2006" xmlns:p14="http://schemas.microsoft.com/office/powerpoint/2010/main">
+    <mc:Choice Requires="p14">
       <p:transition spd="slow" p14:dur="1400">
         <p14:doors dir="vert"/>
       </p:transition>
     </mc:Choice>
-    <mc:Fallback>
+    <mc:Fallback xmlns="">
       <p:transition spd="slow">
         <p:fade/>
       </p:transition>
@@ -12855,13 +12855,13 @@
   <p:clrMapOvr>
     <a:masterClrMapping/>
   </p:clrMapOvr>
-  <mc:AlternateContent xmlns:mc="http://schemas.openxmlformats.org/markup-compatibility/2006">
-    <mc:Choice xmlns:p14="http://schemas.microsoft.com/office/powerpoint/2010/main" Requires="p14">
+  <mc:AlternateContent xmlns:mc="http://schemas.openxmlformats.org/markup-compatibility/2006" xmlns:p14="http://schemas.microsoft.com/office/powerpoint/2010/main">
+    <mc:Choice Requires="p14">
       <p:transition spd="slow" p14:dur="1400">
         <p14:doors dir="vert"/>
       </p:transition>
     </mc:Choice>
-    <mc:Fallback>
+    <mc:Fallback xmlns="">
       <p:transition spd="slow">
         <p:fade/>
       </p:transition>
@@ -13019,7 +13019,7 @@
           <a:noFill/>
           <a:extLst>
             <a:ext uri="{909E8E84-426E-40dd-AFC4-6F175D3DCCD1}">
-              <a14:hiddenFill xmlns:a14="http://schemas.microsoft.com/office/drawing/2010/main" xmlns:p14="http://schemas.microsoft.com/office/powerpoint/2010/main" xmlns:a16="http://schemas.microsoft.com/office/drawing/2014/main" xmlns="">
+              <a14:hiddenFill xmlns="" xmlns:a16="http://schemas.microsoft.com/office/drawing/2014/main" xmlns:p14="http://schemas.microsoft.com/office/powerpoint/2010/main" xmlns:a14="http://schemas.microsoft.com/office/drawing/2010/main">
                 <a:solidFill>
                   <a:srgbClr val="FFFFFF"/>
                 </a:solidFill>
@@ -13234,7 +13234,7 @@
             </a:ln>
             <a:extLst>
               <a:ext uri="{91240B29-F687-4f45-9708-019B960494DF}">
-                <a14:hiddenLine xmlns:a14="http://schemas.microsoft.com/office/drawing/2010/main" xmlns:p14="http://schemas.microsoft.com/office/powerpoint/2010/main" xmlns:a16="http://schemas.microsoft.com/office/drawing/2014/main" xmlns="" w="9525">
+                <a14:hiddenLine xmlns="" xmlns:a16="http://schemas.microsoft.com/office/drawing/2014/main" xmlns:p14="http://schemas.microsoft.com/office/powerpoint/2010/main" xmlns:a14="http://schemas.microsoft.com/office/drawing/2010/main" w="9525">
                   <a:solidFill>
                     <a:srgbClr val="000000"/>
                   </a:solidFill>
@@ -13339,7 +13339,7 @@
             </a:ln>
             <a:extLst>
               <a:ext uri="{91240B29-F687-4f45-9708-019B960494DF}">
-                <a14:hiddenLine xmlns:a14="http://schemas.microsoft.com/office/drawing/2010/main" xmlns:p14="http://schemas.microsoft.com/office/powerpoint/2010/main" xmlns:a16="http://schemas.microsoft.com/office/drawing/2014/main" xmlns="" w="9525">
+                <a14:hiddenLine xmlns="" xmlns:a16="http://schemas.microsoft.com/office/drawing/2014/main" xmlns:p14="http://schemas.microsoft.com/office/powerpoint/2010/main" xmlns:a14="http://schemas.microsoft.com/office/drawing/2010/main" w="9525">
                   <a:solidFill>
                     <a:srgbClr val="000000"/>
                   </a:solidFill>
@@ -13444,7 +13444,7 @@
             </a:ln>
             <a:extLst>
               <a:ext uri="{91240B29-F687-4f45-9708-019B960494DF}">
-                <a14:hiddenLine xmlns:a14="http://schemas.microsoft.com/office/drawing/2010/main" xmlns:p14="http://schemas.microsoft.com/office/powerpoint/2010/main" xmlns:a16="http://schemas.microsoft.com/office/drawing/2014/main" xmlns="" w="9525">
+                <a14:hiddenLine xmlns="" xmlns:a16="http://schemas.microsoft.com/office/drawing/2014/main" xmlns:p14="http://schemas.microsoft.com/office/powerpoint/2010/main" xmlns:a14="http://schemas.microsoft.com/office/drawing/2010/main" w="9525">
                   <a:solidFill>
                     <a:srgbClr val="000000"/>
                   </a:solidFill>
@@ -13521,7 +13521,7 @@
             </a:ln>
             <a:extLst>
               <a:ext uri="{91240B29-F687-4f45-9708-019B960494DF}">
-                <a14:hiddenLine xmlns:a14="http://schemas.microsoft.com/office/drawing/2010/main" xmlns:p14="http://schemas.microsoft.com/office/powerpoint/2010/main" xmlns:a16="http://schemas.microsoft.com/office/drawing/2014/main" xmlns="" w="9525">
+                <a14:hiddenLine xmlns="" xmlns:a16="http://schemas.microsoft.com/office/drawing/2014/main" xmlns:p14="http://schemas.microsoft.com/office/powerpoint/2010/main" xmlns:a14="http://schemas.microsoft.com/office/drawing/2010/main" w="9525">
                   <a:solidFill>
                     <a:srgbClr val="000000"/>
                   </a:solidFill>
@@ -13626,7 +13626,7 @@
             </a:ln>
             <a:extLst>
               <a:ext uri="{91240B29-F687-4f45-9708-019B960494DF}">
-                <a14:hiddenLine xmlns:a14="http://schemas.microsoft.com/office/drawing/2010/main" xmlns:p14="http://schemas.microsoft.com/office/powerpoint/2010/main" xmlns:a16="http://schemas.microsoft.com/office/drawing/2014/main" xmlns="" w="9525">
+                <a14:hiddenLine xmlns="" xmlns:a16="http://schemas.microsoft.com/office/drawing/2014/main" xmlns:p14="http://schemas.microsoft.com/office/powerpoint/2010/main" xmlns:a14="http://schemas.microsoft.com/office/drawing/2010/main" w="9525">
                   <a:solidFill>
                     <a:srgbClr val="000000"/>
                   </a:solidFill>
@@ -13703,7 +13703,7 @@
             </a:ln>
             <a:extLst>
               <a:ext uri="{91240B29-F687-4f45-9708-019B960494DF}">
-                <a14:hiddenLine xmlns:a14="http://schemas.microsoft.com/office/drawing/2010/main" xmlns:p14="http://schemas.microsoft.com/office/powerpoint/2010/main" xmlns:a16="http://schemas.microsoft.com/office/drawing/2014/main" xmlns="" w="9525">
+                <a14:hiddenLine xmlns="" xmlns:a16="http://schemas.microsoft.com/office/drawing/2014/main" xmlns:p14="http://schemas.microsoft.com/office/powerpoint/2010/main" xmlns:a14="http://schemas.microsoft.com/office/drawing/2010/main" w="9525">
                   <a:solidFill>
                     <a:srgbClr val="000000"/>
                   </a:solidFill>
@@ -13780,7 +13780,7 @@
             </a:ln>
             <a:extLst>
               <a:ext uri="{91240B29-F687-4f45-9708-019B960494DF}">
-                <a14:hiddenLine xmlns:a14="http://schemas.microsoft.com/office/drawing/2010/main" xmlns:p14="http://schemas.microsoft.com/office/powerpoint/2010/main" xmlns:a16="http://schemas.microsoft.com/office/drawing/2014/main" xmlns="" w="9525">
+                <a14:hiddenLine xmlns="" xmlns:a16="http://schemas.microsoft.com/office/drawing/2014/main" xmlns:p14="http://schemas.microsoft.com/office/powerpoint/2010/main" xmlns:a14="http://schemas.microsoft.com/office/drawing/2010/main" w="9525">
                   <a:solidFill>
                     <a:srgbClr val="000000"/>
                   </a:solidFill>
@@ -13885,7 +13885,7 @@
             </a:ln>
             <a:extLst>
               <a:ext uri="{91240B29-F687-4f45-9708-019B960494DF}">
-                <a14:hiddenLine xmlns:a14="http://schemas.microsoft.com/office/drawing/2010/main" xmlns:p14="http://schemas.microsoft.com/office/powerpoint/2010/main" xmlns:a16="http://schemas.microsoft.com/office/drawing/2014/main" xmlns="" w="9525">
+                <a14:hiddenLine xmlns="" xmlns:a16="http://schemas.microsoft.com/office/drawing/2014/main" xmlns:p14="http://schemas.microsoft.com/office/powerpoint/2010/main" xmlns:a14="http://schemas.microsoft.com/office/drawing/2010/main" w="9525">
                   <a:solidFill>
                     <a:srgbClr val="000000"/>
                   </a:solidFill>
@@ -13990,7 +13990,7 @@
             </a:ln>
             <a:extLst>
               <a:ext uri="{91240B29-F687-4f45-9708-019B960494DF}">
-                <a14:hiddenLine xmlns:a14="http://schemas.microsoft.com/office/drawing/2010/main" xmlns:p14="http://schemas.microsoft.com/office/powerpoint/2010/main" xmlns:a16="http://schemas.microsoft.com/office/drawing/2014/main" xmlns="" w="9525">
+                <a14:hiddenLine xmlns="" xmlns:a16="http://schemas.microsoft.com/office/drawing/2014/main" xmlns:p14="http://schemas.microsoft.com/office/powerpoint/2010/main" xmlns:a14="http://schemas.microsoft.com/office/drawing/2010/main" w="9525">
                   <a:solidFill>
                     <a:srgbClr val="000000"/>
                   </a:solidFill>
@@ -14067,7 +14067,7 @@
             </a:ln>
             <a:extLst>
               <a:ext uri="{91240B29-F687-4f45-9708-019B960494DF}">
-                <a14:hiddenLine xmlns:a14="http://schemas.microsoft.com/office/drawing/2010/main" xmlns:p14="http://schemas.microsoft.com/office/powerpoint/2010/main" xmlns:a16="http://schemas.microsoft.com/office/drawing/2014/main" xmlns="" w="9525">
+                <a14:hiddenLine xmlns="" xmlns:a16="http://schemas.microsoft.com/office/drawing/2014/main" xmlns:p14="http://schemas.microsoft.com/office/powerpoint/2010/main" xmlns:a14="http://schemas.microsoft.com/office/drawing/2010/main" w="9525">
                   <a:solidFill>
                     <a:srgbClr val="000000"/>
                   </a:solidFill>
@@ -14192,7 +14192,7 @@
             </a:ln>
             <a:extLst>
               <a:ext uri="{91240B29-F687-4f45-9708-019B960494DF}">
-                <a14:hiddenLine xmlns:a14="http://schemas.microsoft.com/office/drawing/2010/main" xmlns:p14="http://schemas.microsoft.com/office/powerpoint/2010/main" xmlns:a16="http://schemas.microsoft.com/office/drawing/2014/main" xmlns="" w="9525">
+                <a14:hiddenLine xmlns="" xmlns:a16="http://schemas.microsoft.com/office/drawing/2014/main" xmlns:p14="http://schemas.microsoft.com/office/powerpoint/2010/main" xmlns:a14="http://schemas.microsoft.com/office/drawing/2010/main" w="9525">
                   <a:solidFill>
                     <a:srgbClr val="000000"/>
                   </a:solidFill>
@@ -14306,7 +14306,7 @@
             </a:ln>
             <a:extLst>
               <a:ext uri="{91240B29-F687-4f45-9708-019B960494DF}">
-                <a14:hiddenLine xmlns:a14="http://schemas.microsoft.com/office/drawing/2010/main" xmlns:p14="http://schemas.microsoft.com/office/powerpoint/2010/main" xmlns:a16="http://schemas.microsoft.com/office/drawing/2014/main" xmlns="" w="9525">
+                <a14:hiddenLine xmlns="" xmlns:a16="http://schemas.microsoft.com/office/drawing/2014/main" xmlns:p14="http://schemas.microsoft.com/office/powerpoint/2010/main" xmlns:a14="http://schemas.microsoft.com/office/drawing/2010/main" w="9525">
                   <a:solidFill>
                     <a:srgbClr val="000000"/>
                   </a:solidFill>
@@ -14383,7 +14383,7 @@
             </a:ln>
             <a:extLst>
               <a:ext uri="{91240B29-F687-4f45-9708-019B960494DF}">
-                <a14:hiddenLine xmlns:a14="http://schemas.microsoft.com/office/drawing/2010/main" xmlns:p14="http://schemas.microsoft.com/office/powerpoint/2010/main" xmlns:a16="http://schemas.microsoft.com/office/drawing/2014/main" xmlns="" w="9525">
+                <a14:hiddenLine xmlns="" xmlns:a16="http://schemas.microsoft.com/office/drawing/2014/main" xmlns:p14="http://schemas.microsoft.com/office/powerpoint/2010/main" xmlns:a14="http://schemas.microsoft.com/office/drawing/2010/main" w="9525">
                   <a:solidFill>
                     <a:srgbClr val="000000"/>
                   </a:solidFill>
@@ -14460,7 +14460,7 @@
             </a:ln>
             <a:extLst>
               <a:ext uri="{91240B29-F687-4f45-9708-019B960494DF}">
-                <a14:hiddenLine xmlns:a14="http://schemas.microsoft.com/office/drawing/2010/main" xmlns:p14="http://schemas.microsoft.com/office/powerpoint/2010/main" xmlns:a16="http://schemas.microsoft.com/office/drawing/2014/main" xmlns="" w="9525">
+                <a14:hiddenLine xmlns="" xmlns:a16="http://schemas.microsoft.com/office/drawing/2014/main" xmlns:p14="http://schemas.microsoft.com/office/powerpoint/2010/main" xmlns:a14="http://schemas.microsoft.com/office/drawing/2010/main" w="9525">
                   <a:solidFill>
                     <a:srgbClr val="000000"/>
                   </a:solidFill>
@@ -14565,7 +14565,7 @@
             </a:ln>
             <a:extLst>
               <a:ext uri="{91240B29-F687-4f45-9708-019B960494DF}">
-                <a14:hiddenLine xmlns:a14="http://schemas.microsoft.com/office/drawing/2010/main" xmlns:p14="http://schemas.microsoft.com/office/powerpoint/2010/main" xmlns:a16="http://schemas.microsoft.com/office/drawing/2014/main" xmlns="" w="9525">
+                <a14:hiddenLine xmlns="" xmlns:a16="http://schemas.microsoft.com/office/drawing/2014/main" xmlns:p14="http://schemas.microsoft.com/office/powerpoint/2010/main" xmlns:a14="http://schemas.microsoft.com/office/drawing/2010/main" w="9525">
                   <a:solidFill>
                     <a:srgbClr val="000000"/>
                   </a:solidFill>
@@ -14614,7 +14614,7 @@
             </a:ln>
             <a:extLst>
               <a:ext uri="{91240B29-F687-4f45-9708-019B960494DF}">
-                <a14:hiddenLine xmlns:a14="http://schemas.microsoft.com/office/drawing/2010/main" xmlns:p14="http://schemas.microsoft.com/office/powerpoint/2010/main" xmlns:a16="http://schemas.microsoft.com/office/drawing/2014/main" xmlns="" w="9525">
+                <a14:hiddenLine xmlns="" xmlns:a16="http://schemas.microsoft.com/office/drawing/2014/main" xmlns:p14="http://schemas.microsoft.com/office/powerpoint/2010/main" xmlns:a14="http://schemas.microsoft.com/office/drawing/2010/main" w="9525">
                   <a:solidFill>
                     <a:srgbClr val="000000"/>
                   </a:solidFill>
@@ -14694,7 +14694,7 @@
             </a:ln>
             <a:extLst>
               <a:ext uri="{91240B29-F687-4f45-9708-019B960494DF}">
-                <a14:hiddenLine xmlns:a14="http://schemas.microsoft.com/office/drawing/2010/main" xmlns:p14="http://schemas.microsoft.com/office/powerpoint/2010/main" xmlns:a16="http://schemas.microsoft.com/office/drawing/2014/main" xmlns="" w="9525">
+                <a14:hiddenLine xmlns="" xmlns:a16="http://schemas.microsoft.com/office/drawing/2014/main" xmlns:p14="http://schemas.microsoft.com/office/powerpoint/2010/main" xmlns:a14="http://schemas.microsoft.com/office/drawing/2010/main" w="9525">
                   <a:solidFill>
                     <a:srgbClr val="000000"/>
                   </a:solidFill>
@@ -14799,7 +14799,7 @@
             </a:ln>
             <a:extLst>
               <a:ext uri="{91240B29-F687-4f45-9708-019B960494DF}">
-                <a14:hiddenLine xmlns:a14="http://schemas.microsoft.com/office/drawing/2010/main" xmlns:p14="http://schemas.microsoft.com/office/powerpoint/2010/main" xmlns:a16="http://schemas.microsoft.com/office/drawing/2014/main" xmlns="" w="9525">
+                <a14:hiddenLine xmlns="" xmlns:a16="http://schemas.microsoft.com/office/drawing/2014/main" xmlns:p14="http://schemas.microsoft.com/office/powerpoint/2010/main" xmlns:a14="http://schemas.microsoft.com/office/drawing/2010/main" w="9525">
                   <a:solidFill>
                     <a:srgbClr val="000000"/>
                   </a:solidFill>
@@ -14876,7 +14876,7 @@
             </a:ln>
             <a:extLst>
               <a:ext uri="{91240B29-F687-4f45-9708-019B960494DF}">
-                <a14:hiddenLine xmlns:a14="http://schemas.microsoft.com/office/drawing/2010/main" xmlns:p14="http://schemas.microsoft.com/office/powerpoint/2010/main" xmlns:a16="http://schemas.microsoft.com/office/drawing/2014/main" xmlns="" w="9525">
+                <a14:hiddenLine xmlns="" xmlns:a16="http://schemas.microsoft.com/office/drawing/2014/main" xmlns:p14="http://schemas.microsoft.com/office/powerpoint/2010/main" xmlns:a14="http://schemas.microsoft.com/office/drawing/2010/main" w="9525">
                   <a:solidFill>
                     <a:srgbClr val="000000"/>
                   </a:solidFill>
@@ -14981,7 +14981,7 @@
             </a:ln>
             <a:extLst>
               <a:ext uri="{91240B29-F687-4f45-9708-019B960494DF}">
-                <a14:hiddenLine xmlns:a14="http://schemas.microsoft.com/office/drawing/2010/main" xmlns:p14="http://schemas.microsoft.com/office/powerpoint/2010/main" xmlns:a16="http://schemas.microsoft.com/office/drawing/2014/main" xmlns="" w="9525">
+                <a14:hiddenLine xmlns="" xmlns:a16="http://schemas.microsoft.com/office/drawing/2014/main" xmlns:p14="http://schemas.microsoft.com/office/powerpoint/2010/main" xmlns:a14="http://schemas.microsoft.com/office/drawing/2010/main" w="9525">
                   <a:solidFill>
                     <a:srgbClr val="000000"/>
                   </a:solidFill>
@@ -15061,7 +15061,7 @@
             </a:ln>
             <a:extLst>
               <a:ext uri="{91240B29-F687-4f45-9708-019B960494DF}">
-                <a14:hiddenLine xmlns:a14="http://schemas.microsoft.com/office/drawing/2010/main" xmlns:p14="http://schemas.microsoft.com/office/powerpoint/2010/main" xmlns:a16="http://schemas.microsoft.com/office/drawing/2014/main" xmlns="" w="9525">
+                <a14:hiddenLine xmlns="" xmlns:a16="http://schemas.microsoft.com/office/drawing/2014/main" xmlns:p14="http://schemas.microsoft.com/office/powerpoint/2010/main" xmlns:a14="http://schemas.microsoft.com/office/drawing/2010/main" w="9525">
                   <a:solidFill>
                     <a:srgbClr val="000000"/>
                   </a:solidFill>
@@ -15138,7 +15138,7 @@
             </a:ln>
             <a:extLst>
               <a:ext uri="{91240B29-F687-4f45-9708-019B960494DF}">
-                <a14:hiddenLine xmlns:a14="http://schemas.microsoft.com/office/drawing/2010/main" xmlns:p14="http://schemas.microsoft.com/office/powerpoint/2010/main" xmlns:a16="http://schemas.microsoft.com/office/drawing/2014/main" xmlns="" w="9525">
+                <a14:hiddenLine xmlns="" xmlns:a16="http://schemas.microsoft.com/office/drawing/2014/main" xmlns:p14="http://schemas.microsoft.com/office/powerpoint/2010/main" xmlns:a14="http://schemas.microsoft.com/office/drawing/2010/main" w="9525">
                   <a:solidFill>
                     <a:srgbClr val="000000"/>
                   </a:solidFill>
@@ -15243,7 +15243,7 @@
             </a:ln>
             <a:extLst>
               <a:ext uri="{91240B29-F687-4f45-9708-019B960494DF}">
-                <a14:hiddenLine xmlns:a14="http://schemas.microsoft.com/office/drawing/2010/main" xmlns:p14="http://schemas.microsoft.com/office/powerpoint/2010/main" xmlns:a16="http://schemas.microsoft.com/office/drawing/2014/main" xmlns="" w="9525">
+                <a14:hiddenLine xmlns="" xmlns:a16="http://schemas.microsoft.com/office/drawing/2014/main" xmlns:p14="http://schemas.microsoft.com/office/powerpoint/2010/main" xmlns:a14="http://schemas.microsoft.com/office/drawing/2010/main" w="9525">
                   <a:solidFill>
                     <a:srgbClr val="000000"/>
                   </a:solidFill>
@@ -15348,7 +15348,7 @@
             </a:ln>
             <a:extLst>
               <a:ext uri="{91240B29-F687-4f45-9708-019B960494DF}">
-                <a14:hiddenLine xmlns:a14="http://schemas.microsoft.com/office/drawing/2010/main" xmlns:p14="http://schemas.microsoft.com/office/powerpoint/2010/main" xmlns:a16="http://schemas.microsoft.com/office/drawing/2014/main" xmlns="" w="9525">
+                <a14:hiddenLine xmlns="" xmlns:a16="http://schemas.microsoft.com/office/drawing/2014/main" xmlns:p14="http://schemas.microsoft.com/office/powerpoint/2010/main" xmlns:a14="http://schemas.microsoft.com/office/drawing/2010/main" w="9525">
                   <a:solidFill>
                     <a:srgbClr val="000000"/>
                   </a:solidFill>
@@ -15428,7 +15428,7 @@
             </a:ln>
             <a:extLst>
               <a:ext uri="{91240B29-F687-4f45-9708-019B960494DF}">
-                <a14:hiddenLine xmlns:a14="http://schemas.microsoft.com/office/drawing/2010/main" xmlns:p14="http://schemas.microsoft.com/office/powerpoint/2010/main" xmlns:a16="http://schemas.microsoft.com/office/drawing/2014/main" xmlns="" w="9525">
+                <a14:hiddenLine xmlns="" xmlns:a16="http://schemas.microsoft.com/office/drawing/2014/main" xmlns:p14="http://schemas.microsoft.com/office/powerpoint/2010/main" xmlns:a14="http://schemas.microsoft.com/office/drawing/2010/main" w="9525">
                   <a:solidFill>
                     <a:srgbClr val="000000"/>
                   </a:solidFill>
@@ -15563,7 +15563,7 @@
             </a:ln>
             <a:extLst>
               <a:ext uri="{91240B29-F687-4f45-9708-019B960494DF}">
-                <a14:hiddenLine xmlns:a14="http://schemas.microsoft.com/office/drawing/2010/main" xmlns:p14="http://schemas.microsoft.com/office/powerpoint/2010/main" xmlns:a16="http://schemas.microsoft.com/office/drawing/2014/main" xmlns="" w="9525">
+                <a14:hiddenLine xmlns="" xmlns:a16="http://schemas.microsoft.com/office/drawing/2014/main" xmlns:p14="http://schemas.microsoft.com/office/powerpoint/2010/main" xmlns:a14="http://schemas.microsoft.com/office/drawing/2010/main" w="9525">
                   <a:solidFill>
                     <a:srgbClr val="000000"/>
                   </a:solidFill>
@@ -15586,13 +15586,13 @@
   <p:clrMapOvr>
     <a:masterClrMapping/>
   </p:clrMapOvr>
-  <mc:AlternateContent xmlns:mc="http://schemas.openxmlformats.org/markup-compatibility/2006">
-    <mc:Choice xmlns:p14="http://schemas.microsoft.com/office/powerpoint/2010/main" Requires="p14">
+  <mc:AlternateContent xmlns:mc="http://schemas.openxmlformats.org/markup-compatibility/2006" xmlns:p14="http://schemas.microsoft.com/office/powerpoint/2010/main">
+    <mc:Choice Requires="p14">
       <p:transition spd="slow" p14:dur="1400">
         <p14:doors dir="vert"/>
       </p:transition>
     </mc:Choice>
-    <mc:Fallback>
+    <mc:Fallback xmlns="">
       <p:transition spd="slow">
         <p:fade/>
       </p:transition>
@@ -15702,13 +15702,13 @@
   <p:clrMapOvr>
     <a:masterClrMapping/>
   </p:clrMapOvr>
-  <mc:AlternateContent xmlns:mc="http://schemas.openxmlformats.org/markup-compatibility/2006">
-    <mc:Choice xmlns:p14="http://schemas.microsoft.com/office/powerpoint/2010/main" Requires="p14">
+  <mc:AlternateContent xmlns:mc="http://schemas.openxmlformats.org/markup-compatibility/2006" xmlns:p14="http://schemas.microsoft.com/office/powerpoint/2010/main">
+    <mc:Choice Requires="p14">
       <p:transition spd="slow" p14:dur="1400">
         <p14:doors dir="vert"/>
       </p:transition>
     </mc:Choice>
-    <mc:Fallback>
+    <mc:Fallback xmlns="">
       <p:transition spd="slow">
         <p:fade/>
       </p:transition>
@@ -15833,13 +15833,13 @@
   <p:clrMapOvr>
     <a:masterClrMapping/>
   </p:clrMapOvr>
-  <mc:AlternateContent xmlns:mc="http://schemas.openxmlformats.org/markup-compatibility/2006">
-    <mc:Choice xmlns:p14="http://schemas.microsoft.com/office/powerpoint/2010/main" Requires="p14">
+  <mc:AlternateContent xmlns:mc="http://schemas.openxmlformats.org/markup-compatibility/2006" xmlns:p14="http://schemas.microsoft.com/office/powerpoint/2010/main">
+    <mc:Choice Requires="p14">
       <p:transition spd="slow" p14:dur="1400">
         <p14:doors dir="vert"/>
       </p:transition>
     </mc:Choice>
-    <mc:Fallback>
+    <mc:Fallback xmlns="">
       <p:transition spd="slow">
         <p:fade/>
       </p:transition>
@@ -15911,13 +15911,13 @@
   <p:clrMapOvr>
     <a:masterClrMapping/>
   </p:clrMapOvr>
-  <mc:AlternateContent xmlns:mc="http://schemas.openxmlformats.org/markup-compatibility/2006">
-    <mc:Choice xmlns:p14="http://schemas.microsoft.com/office/powerpoint/2010/main" Requires="p14">
+  <mc:AlternateContent xmlns:mc="http://schemas.openxmlformats.org/markup-compatibility/2006" xmlns:p14="http://schemas.microsoft.com/office/powerpoint/2010/main">
+    <mc:Choice Requires="p14">
       <p:transition spd="slow" p14:dur="1400">
         <p14:doors dir="vert"/>
       </p:transition>
     </mc:Choice>
-    <mc:Fallback>
+    <mc:Fallback xmlns="">
       <p:transition spd="slow">
         <p:fade/>
       </p:transition>
@@ -15959,43 +15959,194 @@
             <p:ph type="title"/>
           </p:nvPr>
         </p:nvSpPr>
-        <p:spPr/>
+        <p:spPr>
+          <a:xfrm>
+            <a:off x="1002517" y="1394022"/>
+            <a:ext cx="9905998" cy="1478570"/>
+          </a:xfrm>
+        </p:spPr>
         <p:txBody>
-          <a:bodyPr/>
+          <a:bodyPr>
+            <a:normAutofit/>
+          </a:bodyPr>
           <a:lstStyle/>
           <a:p>
+            <a:pPr lvl="0" algn="ctr">
+              <a:lnSpc>
+                <a:spcPct val="120000"/>
+              </a:lnSpc>
+              <a:spcBef>
+                <a:spcPts val="1000"/>
+              </a:spcBef>
+              <a:buSzPct val="125000"/>
+            </a:pPr>
             <a:r>
               <a:rPr lang="en-US" dirty="0"/>
-              <a:t>Links:</a:t>
+              <a:t>Link: </a:t>
             </a:r>
+            <a:r>
+              <a:rPr lang="en-US" sz="3200" b="1" cap="none" dirty="0">
+                <a:solidFill>
+                  <a:prstClr val="white"/>
+                </a:solidFill>
+                <a:ea typeface="+mn-ea"/>
+                <a:cs typeface="+mn-cs"/>
+              </a:rPr>
+              <a:t>https://</a:t>
+            </a:r>
+            <a:r>
+              <a:rPr lang="en-US" sz="3200" b="1" cap="none" dirty="0" err="1">
+                <a:solidFill>
+                  <a:prstClr val="white"/>
+                </a:solidFill>
+                <a:ea typeface="+mn-ea"/>
+                <a:cs typeface="+mn-cs"/>
+              </a:rPr>
+              <a:t>github.com</a:t>
+            </a:r>
+            <a:r>
+              <a:rPr lang="en-US" sz="3200" b="1" cap="none" dirty="0">
+                <a:solidFill>
+                  <a:prstClr val="white"/>
+                </a:solidFill>
+                <a:ea typeface="+mn-ea"/>
+                <a:cs typeface="+mn-cs"/>
+              </a:rPr>
+              <a:t>/</a:t>
+            </a:r>
+            <a:r>
+              <a:rPr lang="en-US" sz="3200" b="1" cap="none" dirty="0" err="1">
+                <a:solidFill>
+                  <a:prstClr val="white"/>
+                </a:solidFill>
+                <a:ea typeface="+mn-ea"/>
+                <a:cs typeface="+mn-cs"/>
+              </a:rPr>
+              <a:t>ZrowGz</a:t>
+            </a:r>
+            <a:r>
+              <a:rPr lang="en-US" sz="3200" b="1" cap="none" dirty="0">
+                <a:solidFill>
+                  <a:prstClr val="white"/>
+                </a:solidFill>
+                <a:ea typeface="+mn-ea"/>
+                <a:cs typeface="+mn-cs"/>
+              </a:rPr>
+              <a:t>/</a:t>
+            </a:r>
+            <a:r>
+              <a:rPr lang="en-US" sz="3200" b="1" cap="none" dirty="0" err="1">
+                <a:solidFill>
+                  <a:prstClr val="white"/>
+                </a:solidFill>
+                <a:ea typeface="+mn-ea"/>
+                <a:cs typeface="+mn-cs"/>
+              </a:rPr>
+              <a:t>knightshade.git</a:t>
+            </a:r>
+            <a:br>
+              <a:rPr lang="en-US" sz="3200" b="1" cap="none" dirty="0">
+                <a:solidFill>
+                  <a:prstClr val="white"/>
+                </a:solidFill>
+                <a:ea typeface="+mn-ea"/>
+                <a:cs typeface="+mn-cs"/>
+              </a:rPr>
+            </a:br>
+            <a:endParaRPr lang="en-US" dirty="0"/>
           </a:p>
         </p:txBody>
       </p:sp>
-      <p:sp>
-        <p:nvSpPr>
-          <p:cNvPr id="3" name="Content Placeholder 2">
+      <p:pic>
+        <p:nvPicPr>
+          <p:cNvPr id="5" name="Picture 4">
             <a:extLst>
               <a:ext uri="{FF2B5EF4-FFF2-40B4-BE49-F238E27FC236}">
-                <a16:creationId xmlns:a16="http://schemas.microsoft.com/office/drawing/2014/main" id="{53A03C9F-1A1D-B84B-93D8-34618D579722}"/>
+                <a16:creationId xmlns:a16="http://schemas.microsoft.com/office/drawing/2014/main" id="{FB21EBEF-A527-EA4E-850F-C6B3F80D2F45}"/>
               </a:ext>
             </a:extLst>
           </p:cNvPr>
-          <p:cNvSpPr>
-            <a:spLocks noGrp="1"/>
-          </p:cNvSpPr>
-          <p:nvPr>
-            <p:ph idx="1"/>
-          </p:nvPr>
-        </p:nvSpPr>
-        <p:spPr/>
-        <p:txBody>
-          <a:bodyPr/>
-          <a:lstStyle/>
-          <a:p>
-            <a:endParaRPr lang="en-US"/>
-          </a:p>
-        </p:txBody>
-      </p:sp>
+          <p:cNvPicPr>
+            <a:picLocks noChangeAspect="1"/>
+          </p:cNvPicPr>
+          <p:nvPr/>
+        </p:nvPicPr>
+        <p:blipFill>
+          <a:blip r:embed="rId2"/>
+          <a:stretch>
+            <a:fillRect/>
+          </a:stretch>
+        </p:blipFill>
+        <p:spPr>
+          <a:xfrm>
+            <a:off x="863203" y="3468688"/>
+            <a:ext cx="3375421" cy="2700337"/>
+          </a:xfrm>
+          <a:prstGeom prst="rect">
+            <a:avLst/>
+          </a:prstGeom>
+        </p:spPr>
+      </p:pic>
+      <p:pic>
+        <p:nvPicPr>
+          <p:cNvPr id="7" name="Picture 6">
+            <a:extLst>
+              <a:ext uri="{FF2B5EF4-FFF2-40B4-BE49-F238E27FC236}">
+                <a16:creationId xmlns:a16="http://schemas.microsoft.com/office/drawing/2014/main" id="{06F73526-6363-5D4E-BF1D-A08B18D8F699}"/>
+              </a:ext>
+            </a:extLst>
+          </p:cNvPr>
+          <p:cNvPicPr>
+            <a:picLocks noChangeAspect="1"/>
+          </p:cNvPicPr>
+          <p:nvPr/>
+        </p:nvPicPr>
+        <p:blipFill>
+          <a:blip r:embed="rId3"/>
+          <a:stretch>
+            <a:fillRect/>
+          </a:stretch>
+        </p:blipFill>
+        <p:spPr>
+          <a:xfrm>
+            <a:off x="8048623" y="3517106"/>
+            <a:ext cx="3616322" cy="2603500"/>
+          </a:xfrm>
+          <a:prstGeom prst="rect">
+            <a:avLst/>
+          </a:prstGeom>
+        </p:spPr>
+      </p:pic>
+      <p:pic>
+        <p:nvPicPr>
+          <p:cNvPr id="8" name="Picture 7">
+            <a:extLst>
+              <a:ext uri="{FF2B5EF4-FFF2-40B4-BE49-F238E27FC236}">
+                <a16:creationId xmlns:a16="http://schemas.microsoft.com/office/drawing/2014/main" id="{7A77FE91-12D0-4549-BFB8-3C9DB45119A8}"/>
+              </a:ext>
+            </a:extLst>
+          </p:cNvPr>
+          <p:cNvPicPr>
+            <a:picLocks noChangeAspect="1"/>
+          </p:cNvPicPr>
+          <p:nvPr/>
+        </p:nvPicPr>
+        <p:blipFill>
+          <a:blip r:embed="rId4"/>
+          <a:stretch>
+            <a:fillRect/>
+          </a:stretch>
+        </p:blipFill>
+        <p:spPr>
+          <a:xfrm>
+            <a:off x="4951411" y="3195030"/>
+            <a:ext cx="2286000" cy="3175000"/>
+          </a:xfrm>
+          <a:prstGeom prst="rect">
+            <a:avLst/>
+          </a:prstGeom>
+        </p:spPr>
+      </p:pic>
     </p:spTree>
     <p:extLst>
       <p:ext uri="{BB962C8B-B14F-4D97-AF65-F5344CB8AC3E}">
@@ -16006,13 +16157,13 @@
   <p:clrMapOvr>
     <a:masterClrMapping/>
   </p:clrMapOvr>
-  <mc:AlternateContent xmlns:mc="http://schemas.openxmlformats.org/markup-compatibility/2006">
-    <mc:Choice xmlns:p14="http://schemas.microsoft.com/office/powerpoint/2010/main" Requires="p14">
+  <mc:AlternateContent xmlns:mc="http://schemas.openxmlformats.org/markup-compatibility/2006" xmlns:p14="http://schemas.microsoft.com/office/powerpoint/2010/main">
+    <mc:Choice Requires="p14">
       <p:transition spd="slow" p14:dur="1400">
         <p14:doors dir="vert"/>
       </p:transition>
     </mc:Choice>
-    <mc:Fallback>
+    <mc:Fallback xmlns="">
       <p:transition spd="slow">
         <p:fade/>
       </p:transition>

</xml_diff>